<commit_message>
Update PCBs and Case files
</commit_message>
<xml_diff>
--- a/PCBs/XLS Temp Sensors/Labels.pptx
+++ b/PCBs/XLS Temp Sensors/Labels.pptx
@@ -105,6 +105,22 @@
       </a:defRPr>
     </a:lvl9pPr>
   </p:defaultTextStyle>
+  <p:extLst>
+    <p:ext uri="{EFAFB233-063F-42B5-8137-9DF3F51BA10A}">
+      <p15:sldGuideLst xmlns:p15="http://schemas.microsoft.com/office/powerpoint/2012/main">
+        <p15:guide id="1" orient="horz" pos="2160">
+          <p15:clr>
+            <a:srgbClr val="A4A3A4"/>
+          </p15:clr>
+        </p15:guide>
+        <p15:guide id="2" pos="2880">
+          <p15:clr>
+            <a:srgbClr val="A4A3A4"/>
+          </p15:clr>
+        </p15:guide>
+      </p15:sldGuideLst>
+    </p:ext>
+  </p:extLst>
 </p:presentation>
 </file>
 
@@ -289,7 +305,7 @@
           <a:p>
             <a:fld id="{A162B2EB-6DE7-8047-8B08-703D7F859445}" type="datetimeFigureOut">
               <a:rPr lang="it-IT" smtClean="0"/>
-              <a:t>28/03/17</a:t>
+              <a:t>18/04/2018</a:t>
             </a:fld>
             <a:endParaRPr lang="it-IT"/>
           </a:p>
@@ -331,7 +347,7 @@
           <a:p>
             <a:fld id="{AF9BCC1C-18D1-2E4D-A4B8-92F27C043CA5}" type="slidenum">
               <a:rPr lang="it-IT" smtClean="0"/>
-              <a:t>‹n.›</a:t>
+              <a:t>‹N›</a:t>
             </a:fld>
             <a:endParaRPr lang="it-IT"/>
           </a:p>
@@ -459,7 +475,7 @@
           <a:p>
             <a:fld id="{A162B2EB-6DE7-8047-8B08-703D7F859445}" type="datetimeFigureOut">
               <a:rPr lang="it-IT" smtClean="0"/>
-              <a:t>28/03/17</a:t>
+              <a:t>18/04/2018</a:t>
             </a:fld>
             <a:endParaRPr lang="it-IT"/>
           </a:p>
@@ -501,7 +517,7 @@
           <a:p>
             <a:fld id="{AF9BCC1C-18D1-2E4D-A4B8-92F27C043CA5}" type="slidenum">
               <a:rPr lang="it-IT" smtClean="0"/>
-              <a:t>‹n.›</a:t>
+              <a:t>‹N›</a:t>
             </a:fld>
             <a:endParaRPr lang="it-IT"/>
           </a:p>
@@ -639,7 +655,7 @@
           <a:p>
             <a:fld id="{A162B2EB-6DE7-8047-8B08-703D7F859445}" type="datetimeFigureOut">
               <a:rPr lang="it-IT" smtClean="0"/>
-              <a:t>28/03/17</a:t>
+              <a:t>18/04/2018</a:t>
             </a:fld>
             <a:endParaRPr lang="it-IT"/>
           </a:p>
@@ -681,7 +697,7 @@
           <a:p>
             <a:fld id="{AF9BCC1C-18D1-2E4D-A4B8-92F27C043CA5}" type="slidenum">
               <a:rPr lang="it-IT" smtClean="0"/>
-              <a:t>‹n.›</a:t>
+              <a:t>‹N›</a:t>
             </a:fld>
             <a:endParaRPr lang="it-IT"/>
           </a:p>
@@ -809,7 +825,7 @@
           <a:p>
             <a:fld id="{A162B2EB-6DE7-8047-8B08-703D7F859445}" type="datetimeFigureOut">
               <a:rPr lang="it-IT" smtClean="0"/>
-              <a:t>28/03/17</a:t>
+              <a:t>18/04/2018</a:t>
             </a:fld>
             <a:endParaRPr lang="it-IT"/>
           </a:p>
@@ -851,7 +867,7 @@
           <a:p>
             <a:fld id="{AF9BCC1C-18D1-2E4D-A4B8-92F27C043CA5}" type="slidenum">
               <a:rPr lang="it-IT" smtClean="0"/>
-              <a:t>‹n.›</a:t>
+              <a:t>‹N›</a:t>
             </a:fld>
             <a:endParaRPr lang="it-IT"/>
           </a:p>
@@ -1055,7 +1071,7 @@
           <a:p>
             <a:fld id="{A162B2EB-6DE7-8047-8B08-703D7F859445}" type="datetimeFigureOut">
               <a:rPr lang="it-IT" smtClean="0"/>
-              <a:t>28/03/17</a:t>
+              <a:t>18/04/2018</a:t>
             </a:fld>
             <a:endParaRPr lang="it-IT"/>
           </a:p>
@@ -1097,7 +1113,7 @@
           <a:p>
             <a:fld id="{AF9BCC1C-18D1-2E4D-A4B8-92F27C043CA5}" type="slidenum">
               <a:rPr lang="it-IT" smtClean="0"/>
-              <a:t>‹n.›</a:t>
+              <a:t>‹N›</a:t>
             </a:fld>
             <a:endParaRPr lang="it-IT"/>
           </a:p>
@@ -1343,7 +1359,7 @@
           <a:p>
             <a:fld id="{A162B2EB-6DE7-8047-8B08-703D7F859445}" type="datetimeFigureOut">
               <a:rPr lang="it-IT" smtClean="0"/>
-              <a:t>28/03/17</a:t>
+              <a:t>18/04/2018</a:t>
             </a:fld>
             <a:endParaRPr lang="it-IT"/>
           </a:p>
@@ -1385,7 +1401,7 @@
           <a:p>
             <a:fld id="{AF9BCC1C-18D1-2E4D-A4B8-92F27C043CA5}" type="slidenum">
               <a:rPr lang="it-IT" smtClean="0"/>
-              <a:t>‹n.›</a:t>
+              <a:t>‹N›</a:t>
             </a:fld>
             <a:endParaRPr lang="it-IT"/>
           </a:p>
@@ -1765,7 +1781,7 @@
           <a:p>
             <a:fld id="{A162B2EB-6DE7-8047-8B08-703D7F859445}" type="datetimeFigureOut">
               <a:rPr lang="it-IT" smtClean="0"/>
-              <a:t>28/03/17</a:t>
+              <a:t>18/04/2018</a:t>
             </a:fld>
             <a:endParaRPr lang="it-IT"/>
           </a:p>
@@ -1807,7 +1823,7 @@
           <a:p>
             <a:fld id="{AF9BCC1C-18D1-2E4D-A4B8-92F27C043CA5}" type="slidenum">
               <a:rPr lang="it-IT" smtClean="0"/>
-              <a:t>‹n.›</a:t>
+              <a:t>‹N›</a:t>
             </a:fld>
             <a:endParaRPr lang="it-IT"/>
           </a:p>
@@ -1883,7 +1899,7 @@
           <a:p>
             <a:fld id="{A162B2EB-6DE7-8047-8B08-703D7F859445}" type="datetimeFigureOut">
               <a:rPr lang="it-IT" smtClean="0"/>
-              <a:t>28/03/17</a:t>
+              <a:t>18/04/2018</a:t>
             </a:fld>
             <a:endParaRPr lang="it-IT"/>
           </a:p>
@@ -1925,7 +1941,7 @@
           <a:p>
             <a:fld id="{AF9BCC1C-18D1-2E4D-A4B8-92F27C043CA5}" type="slidenum">
               <a:rPr lang="it-IT" smtClean="0"/>
-              <a:t>‹n.›</a:t>
+              <a:t>‹N›</a:t>
             </a:fld>
             <a:endParaRPr lang="it-IT"/>
           </a:p>
@@ -1978,7 +1994,7 @@
           <a:p>
             <a:fld id="{A162B2EB-6DE7-8047-8B08-703D7F859445}" type="datetimeFigureOut">
               <a:rPr lang="it-IT" smtClean="0"/>
-              <a:t>28/03/17</a:t>
+              <a:t>18/04/2018</a:t>
             </a:fld>
             <a:endParaRPr lang="it-IT"/>
           </a:p>
@@ -2020,7 +2036,7 @@
           <a:p>
             <a:fld id="{AF9BCC1C-18D1-2E4D-A4B8-92F27C043CA5}" type="slidenum">
               <a:rPr lang="it-IT" smtClean="0"/>
-              <a:t>‹n.›</a:t>
+              <a:t>‹N›</a:t>
             </a:fld>
             <a:endParaRPr lang="it-IT"/>
           </a:p>
@@ -2255,7 +2271,7 @@
           <a:p>
             <a:fld id="{A162B2EB-6DE7-8047-8B08-703D7F859445}" type="datetimeFigureOut">
               <a:rPr lang="it-IT" smtClean="0"/>
-              <a:t>28/03/17</a:t>
+              <a:t>18/04/2018</a:t>
             </a:fld>
             <a:endParaRPr lang="it-IT"/>
           </a:p>
@@ -2297,7 +2313,7 @@
           <a:p>
             <a:fld id="{AF9BCC1C-18D1-2E4D-A4B8-92F27C043CA5}" type="slidenum">
               <a:rPr lang="it-IT" smtClean="0"/>
-              <a:t>‹n.›</a:t>
+              <a:t>‹N›</a:t>
             </a:fld>
             <a:endParaRPr lang="it-IT"/>
           </a:p>
@@ -2508,7 +2524,7 @@
           <a:p>
             <a:fld id="{A162B2EB-6DE7-8047-8B08-703D7F859445}" type="datetimeFigureOut">
               <a:rPr lang="it-IT" smtClean="0"/>
-              <a:t>28/03/17</a:t>
+              <a:t>18/04/2018</a:t>
             </a:fld>
             <a:endParaRPr lang="it-IT"/>
           </a:p>
@@ -2550,7 +2566,7 @@
           <a:p>
             <a:fld id="{AF9BCC1C-18D1-2E4D-A4B8-92F27C043CA5}" type="slidenum">
               <a:rPr lang="it-IT" smtClean="0"/>
-              <a:t>‹n.›</a:t>
+              <a:t>‹N›</a:t>
             </a:fld>
             <a:endParaRPr lang="it-IT"/>
           </a:p>
@@ -2721,7 +2737,7 @@
           <a:p>
             <a:fld id="{A162B2EB-6DE7-8047-8B08-703D7F859445}" type="datetimeFigureOut">
               <a:rPr lang="it-IT" smtClean="0"/>
-              <a:t>28/03/17</a:t>
+              <a:t>18/04/2018</a:t>
             </a:fld>
             <a:endParaRPr lang="it-IT"/>
           </a:p>
@@ -2799,7 +2815,7 @@
           <a:p>
             <a:fld id="{AF9BCC1C-18D1-2E4D-A4B8-92F27C043CA5}" type="slidenum">
               <a:rPr lang="it-IT" smtClean="0"/>
-              <a:t>‹n.›</a:t>
+              <a:t>‹N›</a:t>
             </a:fld>
             <a:endParaRPr lang="it-IT"/>
           </a:p>
@@ -3202,12 +3218,8 @@
           <a:lstStyle/>
           <a:p>
             <a:r>
-              <a:rPr lang="it-IT" dirty="0" err="1" smtClean="0"/>
-              <a:t>XLSdouble’s</a:t>
-            </a:r>
-            <a:r>
               <a:rPr lang="it-IT" dirty="0" smtClean="0"/>
-              <a:t> </a:t>
+              <a:t>XLS </a:t>
             </a:r>
             <a:r>
               <a:rPr lang="it-IT" dirty="0" err="1" smtClean="0"/>
@@ -3396,7 +3408,7 @@
   <p:timing>
     <p:tnLst>
       <p:par>
-        <p:cTn xmlns:p14="http://schemas.microsoft.com/office/powerpoint/2010/main" id="1" dur="indefinite" restart="never" nodeType="tmRoot"/>
+        <p:cTn id="1" dur="indefinite" restart="never" nodeType="tmRoot"/>
       </p:par>
     </p:tnLst>
   </p:timing>

</xml_diff>